<commit_message>
add readme for documentation
</commit_message>
<xml_diff>
--- a/doc/Projecten voor het werkveld 2.pptx
+++ b/doc/Projecten voor het werkveld 2.pptx
@@ -5,10 +5,10 @@
     <p:sldMasterId id="2147483685" r:id="rId1"/>
   </p:sldMasterIdLst>
   <p:notesMasterIdLst>
-    <p:notesMasterId r:id="rId54"/>
+    <p:notesMasterId r:id="rId55"/>
   </p:notesMasterIdLst>
   <p:handoutMasterIdLst>
-    <p:handoutMasterId r:id="rId55"/>
+    <p:handoutMasterId r:id="rId56"/>
   </p:handoutMasterIdLst>
   <p:sldIdLst>
     <p:sldId id="258" r:id="rId2"/>
@@ -62,7 +62,8 @@
     <p:sldId id="425" r:id="rId50"/>
     <p:sldId id="426" r:id="rId51"/>
     <p:sldId id="427" r:id="rId52"/>
-    <p:sldId id="428" r:id="rId53"/>
+    <p:sldId id="438" r:id="rId53"/>
+    <p:sldId id="428" r:id="rId54"/>
   </p:sldIdLst>
   <p:sldSz cx="9144000" cy="6858000" type="screen4x3"/>
   <p:notesSz cx="6858000" cy="9144000"/>
@@ -24735,7 +24736,7 @@
         <p:cNvPr id="1" name="">
           <a:extLst>
             <a:ext uri="{FF2B5EF4-FFF2-40B4-BE49-F238E27FC236}">
-              <a16:creationId xmlns:a16="http://schemas.microsoft.com/office/drawing/2014/main" id="{A668D895-AA55-E539-F6AA-8AF0B77ED03A}"/>
+              <a16:creationId xmlns:a16="http://schemas.microsoft.com/office/drawing/2014/main" id="{02EDE2D7-24F6-0869-40E4-9C001770C2EE}"/>
             </a:ext>
           </a:extLst>
         </p:cNvPr>
@@ -24755,7 +24756,7 @@
           <p:cNvPr id="41987" name="Titel 2">
             <a:extLst>
               <a:ext uri="{FF2B5EF4-FFF2-40B4-BE49-F238E27FC236}">
-                <a16:creationId xmlns:a16="http://schemas.microsoft.com/office/drawing/2014/main" id="{E08F01F4-24CB-1E86-6EC7-BE658159E9BA}"/>
+                <a16:creationId xmlns:a16="http://schemas.microsoft.com/office/drawing/2014/main" id="{A35CA76A-81A7-8F88-62B4-D60B75ED1E27}"/>
               </a:ext>
             </a:extLst>
           </p:cNvPr>
@@ -24787,8 +24788,13 @@
           <a:p>
             <a:r>
               <a:rPr lang="nl-BE" altLang="en-US" dirty="0"/>
-              <a:t>Bedankt</a:t>
-            </a:r>
+              <a:t>CLI control – </a:t>
+            </a:r>
+            <a:r>
+              <a:rPr lang="nl-BE" altLang="en-US" dirty="0" err="1"/>
+              <a:t>enviro_check</a:t>
+            </a:r>
+            <a:endParaRPr lang="nl-BE" altLang="en-US" dirty="0"/>
           </a:p>
         </p:txBody>
       </p:sp>
@@ -24797,7 +24803,7 @@
           <p:cNvPr id="2" name="Footer Placeholder 1">
             <a:extLst>
               <a:ext uri="{FF2B5EF4-FFF2-40B4-BE49-F238E27FC236}">
-                <a16:creationId xmlns:a16="http://schemas.microsoft.com/office/drawing/2014/main" id="{6561B46D-15BF-73EE-D461-9664E8A18F75}"/>
+                <a16:creationId xmlns:a16="http://schemas.microsoft.com/office/drawing/2014/main" id="{1843ABF6-F850-5237-4375-2D700377D85A}"/>
               </a:ext>
             </a:extLst>
           </p:cNvPr>
@@ -24833,7 +24839,7 @@
           <p:cNvPr id="3" name="Slide Number Placeholder 2">
             <a:extLst>
               <a:ext uri="{FF2B5EF4-FFF2-40B4-BE49-F238E27FC236}">
-                <a16:creationId xmlns:a16="http://schemas.microsoft.com/office/drawing/2014/main" id="{A9392256-AA99-8A16-58C9-D67399529620}"/>
+                <a16:creationId xmlns:a16="http://schemas.microsoft.com/office/drawing/2014/main" id="{8F6EA831-A9F6-BE50-23D3-9E4212C4A364}"/>
               </a:ext>
             </a:extLst>
           </p:cNvPr>
@@ -24863,7 +24869,7 @@
           <p:cNvPr id="41988" name="Tijdelijke aanduiding voor dianummer 3">
             <a:extLst>
               <a:ext uri="{FF2B5EF4-FFF2-40B4-BE49-F238E27FC236}">
-                <a16:creationId xmlns:a16="http://schemas.microsoft.com/office/drawing/2014/main" id="{2D558ECE-7233-A7F7-56DF-09C8D253F927}"/>
+                <a16:creationId xmlns:a16="http://schemas.microsoft.com/office/drawing/2014/main" id="{DA4E4541-7058-8D10-10F1-0CC42750CBBD}"/>
               </a:ext>
             </a:extLst>
           </p:cNvPr>
@@ -25010,6 +25016,439 @@
               </a:rPr>
               <a:pPr eaLnBrk="1" hangingPunct="1"/>
               <a:t>52</a:t>
+            </a:fld>
+            <a:endParaRPr lang="nl-BE" altLang="en-US" sz="2000">
+              <a:solidFill>
+                <a:srgbClr val="FFFFFF"/>
+              </a:solidFill>
+              <a:latin typeface="Trebuchet MS" panose="020B0603020202020204" pitchFamily="34" charset="0"/>
+            </a:endParaRPr>
+          </a:p>
+        </p:txBody>
+      </p:sp>
+      <p:sp>
+        <p:nvSpPr>
+          <p:cNvPr id="33" name="Tijdelijke aanduiding voor inhoud 1">
+            <a:extLst>
+              <a:ext uri="{FF2B5EF4-FFF2-40B4-BE49-F238E27FC236}">
+                <a16:creationId xmlns:a16="http://schemas.microsoft.com/office/drawing/2014/main" id="{3B3C04E9-5832-F3AD-A75E-338E91A9B150}"/>
+              </a:ext>
+            </a:extLst>
+          </p:cNvPr>
+          <p:cNvSpPr>
+            <a:spLocks noGrp="1"/>
+          </p:cNvSpPr>
+          <p:nvPr>
+            <p:ph idx="1"/>
+          </p:nvPr>
+        </p:nvSpPr>
+        <p:spPr>
+          <a:xfrm>
+            <a:off x="0" y="927266"/>
+            <a:ext cx="9036496" cy="4950005"/>
+          </a:xfrm>
+        </p:spPr>
+        <p:txBody>
+          <a:bodyPr>
+            <a:noAutofit/>
+          </a:bodyPr>
+          <a:lstStyle/>
+          <a:p>
+            <a:pPr>
+              <a:buFont typeface="Arial" panose="020B0604020202020204" pitchFamily="34" charset="0"/>
+              <a:buChar char="•"/>
+            </a:pPr>
+            <a:r>
+              <a:rPr lang="nl-NL" sz="1500" dirty="0"/>
+              <a:t>Omdat we soms graag controle over processen hebben of data on </a:t>
+            </a:r>
+            <a:r>
+              <a:rPr lang="nl-NL" sz="1500" dirty="0" err="1"/>
+              <a:t>the</a:t>
+            </a:r>
+            <a:r>
+              <a:rPr lang="nl-NL" sz="1500" dirty="0"/>
+              <a:t> </a:t>
+            </a:r>
+            <a:r>
+              <a:rPr lang="nl-NL" sz="1500" dirty="0" err="1"/>
+              <a:t>fly</a:t>
+            </a:r>
+            <a:r>
+              <a:rPr lang="nl-NL" sz="1500" dirty="0"/>
+              <a:t> willen zien</a:t>
+            </a:r>
+          </a:p>
+          <a:p>
+            <a:pPr>
+              <a:buFont typeface="Arial" panose="020B0604020202020204" pitchFamily="34" charset="0"/>
+              <a:buChar char="•"/>
+            </a:pPr>
+            <a:r>
+              <a:rPr lang="nl-NL" sz="1500" dirty="0" err="1"/>
+              <a:t>Cli</a:t>
+            </a:r>
+            <a:r>
+              <a:rPr lang="nl-NL" sz="1500" dirty="0"/>
+              <a:t> tool om te sturen en lezen</a:t>
+            </a:r>
+          </a:p>
+          <a:p>
+            <a:pPr>
+              <a:buFont typeface="Arial" panose="020B0604020202020204" pitchFamily="34" charset="0"/>
+              <a:buChar char="•"/>
+            </a:pPr>
+            <a:endParaRPr lang="nl-NL" sz="1500" dirty="0"/>
+          </a:p>
+          <a:p>
+            <a:pPr>
+              <a:buFont typeface="Arial" panose="020B0604020202020204" pitchFamily="34" charset="0"/>
+              <a:buChar char="•"/>
+            </a:pPr>
+            <a:endParaRPr lang="nl-NL" sz="1500" dirty="0"/>
+          </a:p>
+          <a:p>
+            <a:pPr>
+              <a:buFont typeface="Arial" panose="020B0604020202020204" pitchFamily="34" charset="0"/>
+              <a:buChar char="•"/>
+            </a:pPr>
+            <a:endParaRPr lang="nl-NL" sz="1500" dirty="0"/>
+          </a:p>
+          <a:p>
+            <a:pPr>
+              <a:buFont typeface="Arial" panose="020B0604020202020204" pitchFamily="34" charset="0"/>
+              <a:buChar char="•"/>
+            </a:pPr>
+            <a:endParaRPr lang="nl-NL" sz="600" dirty="0"/>
+          </a:p>
+        </p:txBody>
+      </p:sp>
+      <p:pic>
+        <p:nvPicPr>
+          <p:cNvPr id="5" name="Picture 4">
+            <a:extLst>
+              <a:ext uri="{FF2B5EF4-FFF2-40B4-BE49-F238E27FC236}">
+                <a16:creationId xmlns:a16="http://schemas.microsoft.com/office/drawing/2014/main" id="{60FDF3C6-0ADA-3F12-5363-7C8E522849D1}"/>
+              </a:ext>
+            </a:extLst>
+          </p:cNvPr>
+          <p:cNvPicPr>
+            <a:picLocks noChangeAspect="1"/>
+          </p:cNvPicPr>
+          <p:nvPr/>
+        </p:nvPicPr>
+        <p:blipFill>
+          <a:blip r:embed="rId2"/>
+          <a:stretch>
+            <a:fillRect/>
+          </a:stretch>
+        </p:blipFill>
+        <p:spPr>
+          <a:xfrm>
+            <a:off x="890073" y="2103803"/>
+            <a:ext cx="7363853" cy="3248478"/>
+          </a:xfrm>
+          <a:prstGeom prst="rect">
+            <a:avLst/>
+          </a:prstGeom>
+        </p:spPr>
+      </p:pic>
+    </p:spTree>
+    <p:extLst>
+      <p:ext uri="{BB962C8B-B14F-4D97-AF65-F5344CB8AC3E}">
+        <p14:creationId xmlns:p14="http://schemas.microsoft.com/office/powerpoint/2010/main" val="3235431435"/>
+      </p:ext>
+    </p:extLst>
+  </p:cSld>
+  <p:clrMapOvr>
+    <a:masterClrMapping/>
+  </p:clrMapOvr>
+</p:sld>
+</file>
+
+<file path=ppt/slides/slide53.xml><?xml version="1.0" encoding="utf-8"?>
+<p:sld xmlns:a="http://schemas.openxmlformats.org/drawingml/2006/main" xmlns:r="http://schemas.openxmlformats.org/officeDocument/2006/relationships" xmlns:p="http://schemas.openxmlformats.org/presentationml/2006/main">
+  <p:cSld>
+    <p:spTree>
+      <p:nvGrpSpPr>
+        <p:cNvPr id="1" name="">
+          <a:extLst>
+            <a:ext uri="{FF2B5EF4-FFF2-40B4-BE49-F238E27FC236}">
+              <a16:creationId xmlns:a16="http://schemas.microsoft.com/office/drawing/2014/main" id="{A668D895-AA55-E539-F6AA-8AF0B77ED03A}"/>
+            </a:ext>
+          </a:extLst>
+        </p:cNvPr>
+        <p:cNvGrpSpPr/>
+        <p:nvPr/>
+      </p:nvGrpSpPr>
+      <p:grpSpPr>
+        <a:xfrm>
+          <a:off x="0" y="0"/>
+          <a:ext cx="0" cy="0"/>
+          <a:chOff x="0" y="0"/>
+          <a:chExt cx="0" cy="0"/>
+        </a:xfrm>
+      </p:grpSpPr>
+      <p:sp>
+        <p:nvSpPr>
+          <p:cNvPr id="41987" name="Titel 2">
+            <a:extLst>
+              <a:ext uri="{FF2B5EF4-FFF2-40B4-BE49-F238E27FC236}">
+                <a16:creationId xmlns:a16="http://schemas.microsoft.com/office/drawing/2014/main" id="{E08F01F4-24CB-1E86-6EC7-BE658159E9BA}"/>
+              </a:ext>
+            </a:extLst>
+          </p:cNvPr>
+          <p:cNvSpPr>
+            <a:spLocks noGrp="1"/>
+          </p:cNvSpPr>
+          <p:nvPr>
+            <p:ph type="title"/>
+          </p:nvPr>
+        </p:nvSpPr>
+        <p:spPr>
+          <a:noFill/>
+          <a:extLst>
+            <a:ext uri="{91240B29-F687-4F45-9708-019B960494DF}">
+              <a14:hiddenLine xmlns:a14="http://schemas.microsoft.com/office/drawing/2010/main" w="0">
+                <a:solidFill>
+                  <a:srgbClr val="000000"/>
+                </a:solidFill>
+                <a:miter lim="800000"/>
+                <a:headEnd/>
+                <a:tailEnd/>
+              </a14:hiddenLine>
+            </a:ext>
+          </a:extLst>
+        </p:spPr>
+        <p:txBody>
+          <a:bodyPr/>
+          <a:lstStyle/>
+          <a:p>
+            <a:r>
+              <a:rPr lang="nl-BE" altLang="en-US" dirty="0"/>
+              <a:t>Bedankt</a:t>
+            </a:r>
+          </a:p>
+        </p:txBody>
+      </p:sp>
+      <p:sp>
+        <p:nvSpPr>
+          <p:cNvPr id="2" name="Footer Placeholder 1">
+            <a:extLst>
+              <a:ext uri="{FF2B5EF4-FFF2-40B4-BE49-F238E27FC236}">
+                <a16:creationId xmlns:a16="http://schemas.microsoft.com/office/drawing/2014/main" id="{6561B46D-15BF-73EE-D461-9664E8A18F75}"/>
+              </a:ext>
+            </a:extLst>
+          </p:cNvPr>
+          <p:cNvSpPr>
+            <a:spLocks noGrp="1"/>
+          </p:cNvSpPr>
+          <p:nvPr>
+            <p:ph type="ftr" sz="quarter" idx="11"/>
+          </p:nvPr>
+        </p:nvSpPr>
+        <p:spPr/>
+        <p:txBody>
+          <a:bodyPr/>
+          <a:lstStyle/>
+          <a:p>
+            <a:r>
+              <a:rPr lang="nl-BE" dirty="0"/>
+              <a:t>Projecten van het werkveld – </a:t>
+            </a:r>
+            <a:r>
+              <a:rPr lang="nl-BE" dirty="0" err="1"/>
+              <a:t>IoT</a:t>
+            </a:r>
+            <a:r>
+              <a:rPr lang="nl-BE" dirty="0"/>
+              <a:t> Graduaat</a:t>
+            </a:r>
+          </a:p>
+        </p:txBody>
+      </p:sp>
+      <p:sp>
+        <p:nvSpPr>
+          <p:cNvPr id="3" name="Slide Number Placeholder 2">
+            <a:extLst>
+              <a:ext uri="{FF2B5EF4-FFF2-40B4-BE49-F238E27FC236}">
+                <a16:creationId xmlns:a16="http://schemas.microsoft.com/office/drawing/2014/main" id="{A9392256-AA99-8A16-58C9-D67399529620}"/>
+              </a:ext>
+            </a:extLst>
+          </p:cNvPr>
+          <p:cNvSpPr>
+            <a:spLocks noGrp="1"/>
+          </p:cNvSpPr>
+          <p:nvPr>
+            <p:ph type="sldNum" sz="quarter" idx="12"/>
+          </p:nvPr>
+        </p:nvSpPr>
+        <p:spPr/>
+        <p:txBody>
+          <a:bodyPr/>
+          <a:lstStyle/>
+          <a:p>
+            <a:fld id="{3B80295F-48CD-49FC-897A-CCEC919B8070}" type="slidenum">
+              <a:rPr lang="nl-BE" smtClean="0"/>
+              <a:pPr/>
+              <a:t>53</a:t>
+            </a:fld>
+            <a:endParaRPr lang="nl-BE" dirty="0"/>
+          </a:p>
+        </p:txBody>
+      </p:sp>
+      <p:sp>
+        <p:nvSpPr>
+          <p:cNvPr id="41988" name="Tijdelijke aanduiding voor dianummer 3">
+            <a:extLst>
+              <a:ext uri="{FF2B5EF4-FFF2-40B4-BE49-F238E27FC236}">
+                <a16:creationId xmlns:a16="http://schemas.microsoft.com/office/drawing/2014/main" id="{2D558ECE-7233-A7F7-56DF-09C8D253F927}"/>
+              </a:ext>
+            </a:extLst>
+          </p:cNvPr>
+          <p:cNvSpPr txBox="1">
+            <a:spLocks noGrp="1"/>
+          </p:cNvSpPr>
+          <p:nvPr/>
+        </p:nvSpPr>
+        <p:spPr bwMode="auto">
+          <a:xfrm>
+            <a:off x="360363" y="6083300"/>
+            <a:ext cx="360362" cy="668338"/>
+          </a:xfrm>
+          <a:prstGeom prst="rect">
+            <a:avLst/>
+          </a:prstGeom>
+          <a:solidFill>
+            <a:srgbClr val="00A0AE"/>
+          </a:solidFill>
+          <a:ln>
+            <a:noFill/>
+          </a:ln>
+          <a:extLst>
+            <a:ext uri="{91240B29-F687-4F45-9708-019B960494DF}">
+              <a14:hiddenLine xmlns:a14="http://schemas.microsoft.com/office/drawing/2010/main" w="9525">
+                <a:solidFill>
+                  <a:srgbClr val="000000"/>
+                </a:solidFill>
+                <a:miter lim="800000"/>
+                <a:headEnd/>
+                <a:tailEnd/>
+              </a14:hiddenLine>
+            </a:ext>
+          </a:extLst>
+        </p:spPr>
+        <p:txBody>
+          <a:bodyPr wrap="none" lIns="0" tIns="108000" rIns="0" bIns="0" anchor="ctr"/>
+          <a:lstStyle>
+            <a:lvl1pPr eaLnBrk="0" hangingPunct="0">
+              <a:defRPr>
+                <a:solidFill>
+                  <a:schemeClr val="tx1"/>
+                </a:solidFill>
+                <a:latin typeface="Arial" panose="020B0604020202020204" pitchFamily="34" charset="0"/>
+              </a:defRPr>
+            </a:lvl1pPr>
+            <a:lvl2pPr marL="742950" indent="-285750" eaLnBrk="0" hangingPunct="0">
+              <a:defRPr>
+                <a:solidFill>
+                  <a:schemeClr val="tx1"/>
+                </a:solidFill>
+                <a:latin typeface="Arial" panose="020B0604020202020204" pitchFamily="34" charset="0"/>
+              </a:defRPr>
+            </a:lvl2pPr>
+            <a:lvl3pPr marL="1143000" indent="-228600" eaLnBrk="0" hangingPunct="0">
+              <a:defRPr>
+                <a:solidFill>
+                  <a:schemeClr val="tx1"/>
+                </a:solidFill>
+                <a:latin typeface="Arial" panose="020B0604020202020204" pitchFamily="34" charset="0"/>
+              </a:defRPr>
+            </a:lvl3pPr>
+            <a:lvl4pPr marL="1600200" indent="-228600" eaLnBrk="0" hangingPunct="0">
+              <a:defRPr>
+                <a:solidFill>
+                  <a:schemeClr val="tx1"/>
+                </a:solidFill>
+                <a:latin typeface="Arial" panose="020B0604020202020204" pitchFamily="34" charset="0"/>
+              </a:defRPr>
+            </a:lvl4pPr>
+            <a:lvl5pPr marL="2057400" indent="-228600" eaLnBrk="0" hangingPunct="0">
+              <a:defRPr>
+                <a:solidFill>
+                  <a:schemeClr val="tx1"/>
+                </a:solidFill>
+                <a:latin typeface="Arial" panose="020B0604020202020204" pitchFamily="34" charset="0"/>
+              </a:defRPr>
+            </a:lvl5pPr>
+            <a:lvl6pPr marL="2514600" indent="-228600" eaLnBrk="0" fontAlgn="base" hangingPunct="0">
+              <a:spcBef>
+                <a:spcPct val="0"/>
+              </a:spcBef>
+              <a:spcAft>
+                <a:spcPct val="0"/>
+              </a:spcAft>
+              <a:defRPr>
+                <a:solidFill>
+                  <a:schemeClr val="tx1"/>
+                </a:solidFill>
+                <a:latin typeface="Arial" panose="020B0604020202020204" pitchFamily="34" charset="0"/>
+              </a:defRPr>
+            </a:lvl6pPr>
+            <a:lvl7pPr marL="2971800" indent="-228600" eaLnBrk="0" fontAlgn="base" hangingPunct="0">
+              <a:spcBef>
+                <a:spcPct val="0"/>
+              </a:spcBef>
+              <a:spcAft>
+                <a:spcPct val="0"/>
+              </a:spcAft>
+              <a:defRPr>
+                <a:solidFill>
+                  <a:schemeClr val="tx1"/>
+                </a:solidFill>
+                <a:latin typeface="Arial" panose="020B0604020202020204" pitchFamily="34" charset="0"/>
+              </a:defRPr>
+            </a:lvl7pPr>
+            <a:lvl8pPr marL="3429000" indent="-228600" eaLnBrk="0" fontAlgn="base" hangingPunct="0">
+              <a:spcBef>
+                <a:spcPct val="0"/>
+              </a:spcBef>
+              <a:spcAft>
+                <a:spcPct val="0"/>
+              </a:spcAft>
+              <a:defRPr>
+                <a:solidFill>
+                  <a:schemeClr val="tx1"/>
+                </a:solidFill>
+                <a:latin typeface="Arial" panose="020B0604020202020204" pitchFamily="34" charset="0"/>
+              </a:defRPr>
+            </a:lvl8pPr>
+            <a:lvl9pPr marL="3886200" indent="-228600" eaLnBrk="0" fontAlgn="base" hangingPunct="0">
+              <a:spcBef>
+                <a:spcPct val="0"/>
+              </a:spcBef>
+              <a:spcAft>
+                <a:spcPct val="0"/>
+              </a:spcAft>
+              <a:defRPr>
+                <a:solidFill>
+                  <a:schemeClr val="tx1"/>
+                </a:solidFill>
+                <a:latin typeface="Arial" panose="020B0604020202020204" pitchFamily="34" charset="0"/>
+              </a:defRPr>
+            </a:lvl9pPr>
+          </a:lstStyle>
+          <a:p>
+            <a:pPr eaLnBrk="1" hangingPunct="1"/>
+            <a:fld id="{E7E9740F-FEEC-4722-AD1A-FA148BA257E6}" type="slidenum">
+              <a:rPr lang="nl-BE" altLang="en-US" sz="2000" smtClean="0">
+                <a:solidFill>
+                  <a:srgbClr val="FFFFFF"/>
+                </a:solidFill>
+                <a:latin typeface="Trebuchet MS" panose="020B0603020202020204" pitchFamily="34" charset="0"/>
+              </a:rPr>
+              <a:pPr eaLnBrk="1" hangingPunct="1"/>
+              <a:t>53</a:t>
             </a:fld>
             <a:endParaRPr lang="nl-BE" altLang="en-US" sz="2000">
               <a:solidFill>

</xml_diff>